<commit_message>
working on build docs
</commit_message>
<xml_diff>
--- a/builds/5V-to-90V-boost.pptx
+++ b/builds/5V-to-90V-boost.pptx
@@ -249,7 +249,7 @@
           <a:p>
             <a:fld id="{E422D40D-152D-4B69-B360-2D53339CCA08}" type="datetimeFigureOut">
               <a:rPr lang="en-US" smtClean="0"/>
-              <a:t>8/13/2024</a:t>
+              <a:t>8/27/2024</a:t>
             </a:fld>
             <a:endParaRPr lang="en-US"/>
           </a:p>
@@ -419,7 +419,7 @@
           <a:p>
             <a:fld id="{E422D40D-152D-4B69-B360-2D53339CCA08}" type="datetimeFigureOut">
               <a:rPr lang="en-US" smtClean="0"/>
-              <a:t>8/13/2024</a:t>
+              <a:t>8/27/2024</a:t>
             </a:fld>
             <a:endParaRPr lang="en-US"/>
           </a:p>
@@ -599,7 +599,7 @@
           <a:p>
             <a:fld id="{E422D40D-152D-4B69-B360-2D53339CCA08}" type="datetimeFigureOut">
               <a:rPr lang="en-US" smtClean="0"/>
-              <a:t>8/13/2024</a:t>
+              <a:t>8/27/2024</a:t>
             </a:fld>
             <a:endParaRPr lang="en-US"/>
           </a:p>
@@ -769,7 +769,7 @@
           <a:p>
             <a:fld id="{E422D40D-152D-4B69-B360-2D53339CCA08}" type="datetimeFigureOut">
               <a:rPr lang="en-US" smtClean="0"/>
-              <a:t>8/13/2024</a:t>
+              <a:t>8/27/2024</a:t>
             </a:fld>
             <a:endParaRPr lang="en-US"/>
           </a:p>
@@ -1013,7 +1013,7 @@
           <a:p>
             <a:fld id="{E422D40D-152D-4B69-B360-2D53339CCA08}" type="datetimeFigureOut">
               <a:rPr lang="en-US" smtClean="0"/>
-              <a:t>8/13/2024</a:t>
+              <a:t>8/27/2024</a:t>
             </a:fld>
             <a:endParaRPr lang="en-US"/>
           </a:p>
@@ -1245,7 +1245,7 @@
           <a:p>
             <a:fld id="{E422D40D-152D-4B69-B360-2D53339CCA08}" type="datetimeFigureOut">
               <a:rPr lang="en-US" smtClean="0"/>
-              <a:t>8/13/2024</a:t>
+              <a:t>8/27/2024</a:t>
             </a:fld>
             <a:endParaRPr lang="en-US"/>
           </a:p>
@@ -1612,7 +1612,7 @@
           <a:p>
             <a:fld id="{E422D40D-152D-4B69-B360-2D53339CCA08}" type="datetimeFigureOut">
               <a:rPr lang="en-US" smtClean="0"/>
-              <a:t>8/13/2024</a:t>
+              <a:t>8/27/2024</a:t>
             </a:fld>
             <a:endParaRPr lang="en-US"/>
           </a:p>
@@ -1730,7 +1730,7 @@
           <a:p>
             <a:fld id="{E422D40D-152D-4B69-B360-2D53339CCA08}" type="datetimeFigureOut">
               <a:rPr lang="en-US" smtClean="0"/>
-              <a:t>8/13/2024</a:t>
+              <a:t>8/27/2024</a:t>
             </a:fld>
             <a:endParaRPr lang="en-US"/>
           </a:p>
@@ -1825,7 +1825,7 @@
           <a:p>
             <a:fld id="{E422D40D-152D-4B69-B360-2D53339CCA08}" type="datetimeFigureOut">
               <a:rPr lang="en-US" smtClean="0"/>
-              <a:t>8/13/2024</a:t>
+              <a:t>8/27/2024</a:t>
             </a:fld>
             <a:endParaRPr lang="en-US"/>
           </a:p>
@@ -2102,7 +2102,7 @@
           <a:p>
             <a:fld id="{E422D40D-152D-4B69-B360-2D53339CCA08}" type="datetimeFigureOut">
               <a:rPr lang="en-US" smtClean="0"/>
-              <a:t>8/13/2024</a:t>
+              <a:t>8/27/2024</a:t>
             </a:fld>
             <a:endParaRPr lang="en-US"/>
           </a:p>
@@ -2359,7 +2359,7 @@
           <a:p>
             <a:fld id="{E422D40D-152D-4B69-B360-2D53339CCA08}" type="datetimeFigureOut">
               <a:rPr lang="en-US" smtClean="0"/>
-              <a:t>8/13/2024</a:t>
+              <a:t>8/27/2024</a:t>
             </a:fld>
             <a:endParaRPr lang="en-US"/>
           </a:p>
@@ -2572,7 +2572,7 @@
           <a:p>
             <a:fld id="{E422D40D-152D-4B69-B360-2D53339CCA08}" type="datetimeFigureOut">
               <a:rPr lang="en-US" smtClean="0"/>
-              <a:t>8/13/2024</a:t>
+              <a:t>8/27/2024</a:t>
             </a:fld>
             <a:endParaRPr lang="en-US"/>
           </a:p>
@@ -3000,12 +3000,21 @@
           </a:xfrm>
         </p:spPr>
         <p:txBody>
-          <a:bodyPr/>
+          <a:bodyPr>
+            <a:normAutofit fontScale="90000"/>
+          </a:bodyPr>
           <a:lstStyle/>
           <a:p>
             <a:r>
               <a:rPr lang="en-US" dirty="0"/>
               <a:t>5V to 90V Boost</a:t>
+            </a:r>
+            <a:br>
+              <a:rPr lang="en-US" dirty="0"/>
+            </a:br>
+            <a:r>
+              <a:rPr lang="en-US" dirty="0"/>
+              <a:t>Build</a:t>
             </a:r>
           </a:p>
         </p:txBody>
@@ -3533,59 +3542,6 @@
           </a:p>
         </p:txBody>
       </p:sp>
-      <p:sp>
-        <p:nvSpPr>
-          <p:cNvPr id="15" name="Rectangle: Rounded Corners 14">
-            <a:extLst>
-              <a:ext uri="{FF2B5EF4-FFF2-40B4-BE49-F238E27FC236}">
-                <a16:creationId xmlns:a16="http://schemas.microsoft.com/office/drawing/2014/main" id="{EB4D714E-BC17-66EE-CD81-FAD39D236D99}"/>
-              </a:ext>
-            </a:extLst>
-          </p:cNvPr>
-          <p:cNvSpPr/>
-          <p:nvPr/>
-        </p:nvSpPr>
-        <p:spPr>
-          <a:xfrm>
-            <a:off x="341725" y="6153240"/>
-            <a:ext cx="2671807" cy="613345"/>
-          </a:xfrm>
-          <a:prstGeom prst="roundRect">
-            <a:avLst/>
-          </a:prstGeom>
-          <a:ln>
-            <a:solidFill>
-              <a:schemeClr val="tx1"/>
-            </a:solidFill>
-          </a:ln>
-        </p:spPr>
-        <p:style>
-          <a:lnRef idx="3">
-            <a:schemeClr val="lt1"/>
-          </a:lnRef>
-          <a:fillRef idx="1">
-            <a:schemeClr val="accent6"/>
-          </a:fillRef>
-          <a:effectRef idx="1">
-            <a:schemeClr val="accent6"/>
-          </a:effectRef>
-          <a:fontRef idx="minor">
-            <a:schemeClr val="lt1"/>
-          </a:fontRef>
-        </p:style>
-        <p:txBody>
-          <a:bodyPr rtlCol="0" anchor="ctr"/>
-          <a:lstStyle/>
-          <a:p>
-            <a:pPr algn="ctr"/>
-            <a:r>
-              <a:rPr lang="en-US" sz="3300" dirty="0"/>
-              <a:t>MEMSDuino</a:t>
-            </a:r>
-            <a:endParaRPr lang="en-US" sz="1350" dirty="0"/>
-          </a:p>
-        </p:txBody>
-      </p:sp>
     </p:spTree>
     <p:extLst>
       <p:ext uri="{BB962C8B-B14F-4D97-AF65-F5344CB8AC3E}">
@@ -3767,59 +3723,6 @@
           </a:ln>
         </p:spPr>
       </p:pic>
-      <p:sp>
-        <p:nvSpPr>
-          <p:cNvPr id="3" name="Rectangle: Rounded Corners 2">
-            <a:extLst>
-              <a:ext uri="{FF2B5EF4-FFF2-40B4-BE49-F238E27FC236}">
-                <a16:creationId xmlns:a16="http://schemas.microsoft.com/office/drawing/2014/main" id="{F7E5E23F-4315-E59E-3548-1B307730BCAF}"/>
-              </a:ext>
-            </a:extLst>
-          </p:cNvPr>
-          <p:cNvSpPr/>
-          <p:nvPr/>
-        </p:nvSpPr>
-        <p:spPr>
-          <a:xfrm>
-            <a:off x="2997013" y="6111003"/>
-            <a:ext cx="2671807" cy="613345"/>
-          </a:xfrm>
-          <a:prstGeom prst="roundRect">
-            <a:avLst/>
-          </a:prstGeom>
-          <a:ln>
-            <a:solidFill>
-              <a:schemeClr val="tx1"/>
-            </a:solidFill>
-          </a:ln>
-        </p:spPr>
-        <p:style>
-          <a:lnRef idx="3">
-            <a:schemeClr val="lt1"/>
-          </a:lnRef>
-          <a:fillRef idx="1">
-            <a:schemeClr val="accent6"/>
-          </a:fillRef>
-          <a:effectRef idx="1">
-            <a:schemeClr val="accent6"/>
-          </a:effectRef>
-          <a:fontRef idx="minor">
-            <a:schemeClr val="lt1"/>
-          </a:fontRef>
-        </p:style>
-        <p:txBody>
-          <a:bodyPr rtlCol="0" anchor="ctr"/>
-          <a:lstStyle/>
-          <a:p>
-            <a:pPr algn="ctr"/>
-            <a:r>
-              <a:rPr lang="en-US" sz="3300" dirty="0"/>
-              <a:t>MEMSDuino</a:t>
-            </a:r>
-            <a:endParaRPr lang="en-US" sz="1350" dirty="0"/>
-          </a:p>
-        </p:txBody>
-      </p:sp>
     </p:spTree>
     <p:extLst>
       <p:ext uri="{BB962C8B-B14F-4D97-AF65-F5344CB8AC3E}">
@@ -4182,59 +4085,6 @@
           </a:p>
         </p:txBody>
       </p:sp>
-      <p:sp>
-        <p:nvSpPr>
-          <p:cNvPr id="10" name="Rectangle: Rounded Corners 9">
-            <a:extLst>
-              <a:ext uri="{FF2B5EF4-FFF2-40B4-BE49-F238E27FC236}">
-                <a16:creationId xmlns:a16="http://schemas.microsoft.com/office/drawing/2014/main" id="{C60EE042-F49B-6C3A-7765-135CCF2DDB92}"/>
-              </a:ext>
-            </a:extLst>
-          </p:cNvPr>
-          <p:cNvSpPr/>
-          <p:nvPr/>
-        </p:nvSpPr>
-        <p:spPr>
-          <a:xfrm>
-            <a:off x="334929" y="6108293"/>
-            <a:ext cx="2671807" cy="613345"/>
-          </a:xfrm>
-          <a:prstGeom prst="roundRect">
-            <a:avLst/>
-          </a:prstGeom>
-          <a:ln>
-            <a:solidFill>
-              <a:schemeClr val="tx1"/>
-            </a:solidFill>
-          </a:ln>
-        </p:spPr>
-        <p:style>
-          <a:lnRef idx="3">
-            <a:schemeClr val="lt1"/>
-          </a:lnRef>
-          <a:fillRef idx="1">
-            <a:schemeClr val="accent6"/>
-          </a:fillRef>
-          <a:effectRef idx="1">
-            <a:schemeClr val="accent6"/>
-          </a:effectRef>
-          <a:fontRef idx="minor">
-            <a:schemeClr val="lt1"/>
-          </a:fontRef>
-        </p:style>
-        <p:txBody>
-          <a:bodyPr rtlCol="0" anchor="ctr"/>
-          <a:lstStyle/>
-          <a:p>
-            <a:pPr algn="ctr"/>
-            <a:r>
-              <a:rPr lang="en-US" sz="3300" dirty="0"/>
-              <a:t>MEMSDuino</a:t>
-            </a:r>
-            <a:endParaRPr lang="en-US" sz="1350" dirty="0"/>
-          </a:p>
-        </p:txBody>
-      </p:sp>
     </p:spTree>
     <p:extLst>
       <p:ext uri="{BB962C8B-B14F-4D97-AF65-F5344CB8AC3E}">
@@ -4417,59 +4267,6 @@
           </a:ln>
         </p:spPr>
       </p:pic>
-      <p:sp>
-        <p:nvSpPr>
-          <p:cNvPr id="3" name="Rectangle: Rounded Corners 2">
-            <a:extLst>
-              <a:ext uri="{FF2B5EF4-FFF2-40B4-BE49-F238E27FC236}">
-                <a16:creationId xmlns:a16="http://schemas.microsoft.com/office/drawing/2014/main" id="{89FB46D4-4FFA-3B3E-B8DD-A14AC3504AB2}"/>
-              </a:ext>
-            </a:extLst>
-          </p:cNvPr>
-          <p:cNvSpPr/>
-          <p:nvPr/>
-        </p:nvSpPr>
-        <p:spPr>
-          <a:xfrm>
-            <a:off x="2997013" y="6111003"/>
-            <a:ext cx="2671807" cy="613345"/>
-          </a:xfrm>
-          <a:prstGeom prst="roundRect">
-            <a:avLst/>
-          </a:prstGeom>
-          <a:ln>
-            <a:solidFill>
-              <a:schemeClr val="tx1"/>
-            </a:solidFill>
-          </a:ln>
-        </p:spPr>
-        <p:style>
-          <a:lnRef idx="3">
-            <a:schemeClr val="lt1"/>
-          </a:lnRef>
-          <a:fillRef idx="1">
-            <a:schemeClr val="accent6"/>
-          </a:fillRef>
-          <a:effectRef idx="1">
-            <a:schemeClr val="accent6"/>
-          </a:effectRef>
-          <a:fontRef idx="minor">
-            <a:schemeClr val="lt1"/>
-          </a:fontRef>
-        </p:style>
-        <p:txBody>
-          <a:bodyPr rtlCol="0" anchor="ctr"/>
-          <a:lstStyle/>
-          <a:p>
-            <a:pPr algn="ctr"/>
-            <a:r>
-              <a:rPr lang="en-US" sz="3300" dirty="0"/>
-              <a:t>MEMSDuino</a:t>
-            </a:r>
-            <a:endParaRPr lang="en-US" sz="1350" dirty="0"/>
-          </a:p>
-        </p:txBody>
-      </p:sp>
     </p:spTree>
     <p:extLst>
       <p:ext uri="{BB962C8B-B14F-4D97-AF65-F5344CB8AC3E}">
@@ -4653,54 +4450,160 @@
       </p:pic>
       <p:sp>
         <p:nvSpPr>
-          <p:cNvPr id="3" name="Rectangle: Rounded Corners 2">
+          <p:cNvPr id="7" name="TextBox 6">
             <a:extLst>
               <a:ext uri="{FF2B5EF4-FFF2-40B4-BE49-F238E27FC236}">
-                <a16:creationId xmlns:a16="http://schemas.microsoft.com/office/drawing/2014/main" id="{8CDB3595-2200-6EA9-F3CD-BAD6EC0EC1AA}"/>
+                <a16:creationId xmlns:a16="http://schemas.microsoft.com/office/drawing/2014/main" id="{EFA726FF-274C-392D-76D5-16066F3F69F8}"/>
               </a:ext>
             </a:extLst>
           </p:cNvPr>
-          <p:cNvSpPr/>
+          <p:cNvSpPr txBox="1"/>
           <p:nvPr/>
         </p:nvSpPr>
         <p:spPr>
           <a:xfrm>
-            <a:off x="2997013" y="6111003"/>
-            <a:ext cx="2671807" cy="613345"/>
-          </a:xfrm>
-          <a:prstGeom prst="roundRect">
+            <a:off x="1151507" y="5840363"/>
+            <a:ext cx="1827167" cy="369332"/>
+          </a:xfrm>
+          <a:prstGeom prst="rect">
             <a:avLst/>
           </a:prstGeom>
-          <a:ln>
+          <a:noFill/>
+        </p:spPr>
+        <p:txBody>
+          <a:bodyPr wrap="none" rtlCol="0">
+            <a:spAutoFit/>
+          </a:bodyPr>
+          <a:lstStyle/>
+          <a:p>
+            <a:r>
+              <a:rPr lang="en-US" dirty="0"/>
+              <a:t>HV-DCDC-bracket</a:t>
+            </a:r>
+          </a:p>
+        </p:txBody>
+      </p:sp>
+      <p:cxnSp>
+        <p:nvCxnSpPr>
+          <p:cNvPr id="9" name="Straight Arrow Connector 8">
+            <a:extLst>
+              <a:ext uri="{FF2B5EF4-FFF2-40B4-BE49-F238E27FC236}">
+                <a16:creationId xmlns:a16="http://schemas.microsoft.com/office/drawing/2014/main" id="{C2232DD2-971A-F500-64F6-96C74311F2FA}"/>
+              </a:ext>
+            </a:extLst>
+          </p:cNvPr>
+          <p:cNvCxnSpPr>
+            <a:cxnSpLocks/>
+            <a:stCxn id="7" idx="0"/>
+          </p:cNvCxnSpPr>
+          <p:nvPr/>
+        </p:nvCxnSpPr>
+        <p:spPr>
+          <a:xfrm flipV="1">
+            <a:off x="2065091" y="4708938"/>
+            <a:ext cx="604366" cy="1131425"/>
+          </a:xfrm>
+          <a:prstGeom prst="straightConnector1">
+            <a:avLst/>
+          </a:prstGeom>
+          <a:ln w="41275">
             <a:solidFill>
               <a:schemeClr val="tx1"/>
             </a:solidFill>
+            <a:tailEnd type="triangle"/>
           </a:ln>
         </p:spPr>
         <p:style>
-          <a:lnRef idx="3">
-            <a:schemeClr val="lt1"/>
+          <a:lnRef idx="1">
+            <a:schemeClr val="accent1"/>
           </a:lnRef>
-          <a:fillRef idx="1">
-            <a:schemeClr val="accent6"/>
+          <a:fillRef idx="0">
+            <a:schemeClr val="accent1"/>
           </a:fillRef>
-          <a:effectRef idx="1">
-            <a:schemeClr val="accent6"/>
+          <a:effectRef idx="0">
+            <a:schemeClr val="accent1"/>
           </a:effectRef>
           <a:fontRef idx="minor">
-            <a:schemeClr val="lt1"/>
+            <a:schemeClr val="tx1"/>
           </a:fontRef>
         </p:style>
-        <p:txBody>
-          <a:bodyPr rtlCol="0" anchor="ctr"/>
-          <a:lstStyle/>
-          <a:p>
-            <a:pPr algn="ctr"/>
-            <a:r>
-              <a:rPr lang="en-US" sz="3300" dirty="0"/>
-              <a:t>MEMSDuino</a:t>
-            </a:r>
-            <a:endParaRPr lang="en-US" sz="1350" dirty="0"/>
+      </p:cxnSp>
+      <p:cxnSp>
+        <p:nvCxnSpPr>
+          <p:cNvPr id="13" name="Straight Arrow Connector 12">
+            <a:extLst>
+              <a:ext uri="{FF2B5EF4-FFF2-40B4-BE49-F238E27FC236}">
+                <a16:creationId xmlns:a16="http://schemas.microsoft.com/office/drawing/2014/main" id="{4A31AE02-B16B-8502-DAC2-69B0B49621B4}"/>
+              </a:ext>
+            </a:extLst>
+          </p:cNvPr>
+          <p:cNvCxnSpPr>
+            <a:cxnSpLocks/>
+          </p:cNvCxnSpPr>
+          <p:nvPr/>
+        </p:nvCxnSpPr>
+        <p:spPr>
+          <a:xfrm flipV="1">
+            <a:off x="1231311" y="4412050"/>
+            <a:ext cx="1282290" cy="890664"/>
+          </a:xfrm>
+          <a:prstGeom prst="straightConnector1">
+            <a:avLst/>
+          </a:prstGeom>
+          <a:ln w="41275">
+            <a:solidFill>
+              <a:schemeClr val="tx1"/>
+            </a:solidFill>
+            <a:tailEnd type="triangle"/>
+          </a:ln>
+        </p:spPr>
+        <p:style>
+          <a:lnRef idx="1">
+            <a:schemeClr val="accent1"/>
+          </a:lnRef>
+          <a:fillRef idx="0">
+            <a:schemeClr val="accent1"/>
+          </a:fillRef>
+          <a:effectRef idx="0">
+            <a:schemeClr val="accent1"/>
+          </a:effectRef>
+          <a:fontRef idx="minor">
+            <a:schemeClr val="tx1"/>
+          </a:fontRef>
+        </p:style>
+      </p:cxnSp>
+      <p:sp>
+        <p:nvSpPr>
+          <p:cNvPr id="16" name="TextBox 15">
+            <a:extLst>
+              <a:ext uri="{FF2B5EF4-FFF2-40B4-BE49-F238E27FC236}">
+                <a16:creationId xmlns:a16="http://schemas.microsoft.com/office/drawing/2014/main" id="{7517A86A-F079-FD99-9845-93108786D1E6}"/>
+              </a:ext>
+            </a:extLst>
+          </p:cNvPr>
+          <p:cNvSpPr txBox="1"/>
+          <p:nvPr/>
+        </p:nvSpPr>
+        <p:spPr>
+          <a:xfrm>
+            <a:off x="110296" y="5202206"/>
+            <a:ext cx="1587486" cy="369332"/>
+          </a:xfrm>
+          <a:prstGeom prst="rect">
+            <a:avLst/>
+          </a:prstGeom>
+          <a:noFill/>
+        </p:spPr>
+        <p:txBody>
+          <a:bodyPr wrap="none" rtlCol="0">
+            <a:spAutoFit/>
+          </a:bodyPr>
+          <a:lstStyle/>
+          <a:p>
+            <a:r>
+              <a:rPr lang="en-US" dirty="0"/>
+              <a:t>4-40 ¼” screws</a:t>
+            </a:r>
           </a:p>
         </p:txBody>
       </p:sp>
@@ -4884,59 +4787,6 @@
               <a:rPr lang="en-US" dirty="0"/>
               <a:t>5V to Boost</a:t>
             </a:r>
-          </a:p>
-        </p:txBody>
-      </p:sp>
-      <p:sp>
-        <p:nvSpPr>
-          <p:cNvPr id="6" name="Rectangle: Rounded Corners 5">
-            <a:extLst>
-              <a:ext uri="{FF2B5EF4-FFF2-40B4-BE49-F238E27FC236}">
-                <a16:creationId xmlns:a16="http://schemas.microsoft.com/office/drawing/2014/main" id="{F942353A-B8D3-48A4-4E88-0B717FFF71FC}"/>
-              </a:ext>
-            </a:extLst>
-          </p:cNvPr>
-          <p:cNvSpPr/>
-          <p:nvPr/>
-        </p:nvSpPr>
-        <p:spPr>
-          <a:xfrm>
-            <a:off x="2997013" y="6111003"/>
-            <a:ext cx="2671807" cy="613345"/>
-          </a:xfrm>
-          <a:prstGeom prst="roundRect">
-            <a:avLst/>
-          </a:prstGeom>
-          <a:ln>
-            <a:solidFill>
-              <a:schemeClr val="tx1"/>
-            </a:solidFill>
-          </a:ln>
-        </p:spPr>
-        <p:style>
-          <a:lnRef idx="3">
-            <a:schemeClr val="lt1"/>
-          </a:lnRef>
-          <a:fillRef idx="1">
-            <a:schemeClr val="accent6"/>
-          </a:fillRef>
-          <a:effectRef idx="1">
-            <a:schemeClr val="accent6"/>
-          </a:effectRef>
-          <a:fontRef idx="minor">
-            <a:schemeClr val="lt1"/>
-          </a:fontRef>
-        </p:style>
-        <p:txBody>
-          <a:bodyPr rtlCol="0" anchor="ctr"/>
-          <a:lstStyle/>
-          <a:p>
-            <a:pPr algn="ctr"/>
-            <a:r>
-              <a:rPr lang="en-US" sz="3300" dirty="0"/>
-              <a:t>MEMSDuino</a:t>
-            </a:r>
-            <a:endParaRPr lang="en-US" sz="1350" dirty="0"/>
           </a:p>
         </p:txBody>
       </p:sp>

</xml_diff>